<commit_message>
started tipcalculator work, added W5 folder
</commit_message>
<xml_diff>
--- a/403_Programming/assignments/palindromeprogress_screenshots.pptx
+++ b/403_Programming/assignments/palindromeprogress_screenshots.pptx
@@ -108,13 +108,18 @@
       </a:defRPr>
     </a:lvl9pPr>
   </p:defaultTextStyle>
+  <p:extLst>
+    <p:ext uri="{EFAFB233-063F-42B5-8137-9DF3F51BA10A}">
+      <p15:sldGuideLst xmlns:p15="http://schemas.microsoft.com/office/powerpoint/2012/main"/>
+    </p:ext>
+  </p:extLst>
 </p:presentation>
 </file>
 
 <file path=ppt/revisionInfo.xml><?xml version="1.0" encoding="utf-8"?>
 <p1510:revInfo xmlns:a="http://schemas.openxmlformats.org/drawingml/2006/main" xmlns:r="http://schemas.openxmlformats.org/officeDocument/2006/relationships" xmlns:p1510="http://schemas.microsoft.com/office/powerpoint/2015/10/main">
   <p1510:revLst>
-    <p1510:client id="{06B55A28-D9D7-4806-A81C-4DFD3623E273}" v="8" dt="2025-02-06T12:02:07.965"/>
+    <p1510:client id="{06B55A28-D9D7-4806-A81C-4DFD3623E273}" v="10" dt="2025-02-10T09:00:47.215"/>
   </p1510:revLst>
 </p1510:revInfo>
 </file>
@@ -124,18 +129,18 @@
   <pc:docChgLst>
     <pc:chgData name="Ocean Graham" userId="c784d4c6-724f-4452-8baf-8c216b3c246d" providerId="ADAL" clId="{06B55A28-D9D7-4806-A81C-4DFD3623E273}"/>
     <pc:docChg chg="undo custSel addSld modSld">
-      <pc:chgData name="Ocean Graham" userId="c784d4c6-724f-4452-8baf-8c216b3c246d" providerId="ADAL" clId="{06B55A28-D9D7-4806-A81C-4DFD3623E273}" dt="2025-02-06T12:02:41.161" v="360" actId="20577"/>
+      <pc:chgData name="Ocean Graham" userId="c784d4c6-724f-4452-8baf-8c216b3c246d" providerId="ADAL" clId="{06B55A28-D9D7-4806-A81C-4DFD3623E273}" dt="2025-02-10T10:38:28.056" v="491" actId="20577"/>
       <pc:docMkLst>
         <pc:docMk/>
       </pc:docMkLst>
       <pc:sldChg chg="modSp mod">
-        <pc:chgData name="Ocean Graham" userId="c784d4c6-724f-4452-8baf-8c216b3c246d" providerId="ADAL" clId="{06B55A28-D9D7-4806-A81C-4DFD3623E273}" dt="2025-02-06T10:57:00.435" v="90" actId="20577"/>
+        <pc:chgData name="Ocean Graham" userId="c784d4c6-724f-4452-8baf-8c216b3c246d" providerId="ADAL" clId="{06B55A28-D9D7-4806-A81C-4DFD3623E273}" dt="2025-02-10T10:38:28.056" v="491" actId="20577"/>
         <pc:sldMkLst>
           <pc:docMk/>
           <pc:sldMk cId="1454330601" sldId="256"/>
         </pc:sldMkLst>
         <pc:spChg chg="mod">
-          <ac:chgData name="Ocean Graham" userId="c784d4c6-724f-4452-8baf-8c216b3c246d" providerId="ADAL" clId="{06B55A28-D9D7-4806-A81C-4DFD3623E273}" dt="2025-02-06T10:57:00.435" v="90" actId="20577"/>
+          <ac:chgData name="Ocean Graham" userId="c784d4c6-724f-4452-8baf-8c216b3c246d" providerId="ADAL" clId="{06B55A28-D9D7-4806-A81C-4DFD3623E273}" dt="2025-02-10T10:38:28.056" v="491" actId="20577"/>
           <ac:spMkLst>
             <pc:docMk/>
             <pc:sldMk cId="1454330601" sldId="256"/>
@@ -155,14 +160,6 @@
             <pc:docMk/>
             <pc:sldMk cId="1825111156" sldId="259"/>
             <ac:spMk id="2" creationId="{980758FF-2ED5-3482-398F-56755C620C35}"/>
-          </ac:spMkLst>
-        </pc:spChg>
-        <pc:spChg chg="del">
-          <ac:chgData name="Ocean Graham" userId="c784d4c6-724f-4452-8baf-8c216b3c246d" providerId="ADAL" clId="{06B55A28-D9D7-4806-A81C-4DFD3623E273}" dt="2025-02-06T10:28:21.918" v="49" actId="931"/>
-          <ac:spMkLst>
-            <pc:docMk/>
-            <pc:sldMk cId="1825111156" sldId="259"/>
-            <ac:spMk id="3" creationId="{4D1C3258-A886-35D5-2FCB-C2ABE6B9F874}"/>
           </ac:spMkLst>
         </pc:spChg>
         <pc:spChg chg="add mod">
@@ -207,7 +204,7 @@
         </pc:picChg>
       </pc:sldChg>
       <pc:sldChg chg="addSp delSp modSp new mod">
-        <pc:chgData name="Ocean Graham" userId="c784d4c6-724f-4452-8baf-8c216b3c246d" providerId="ADAL" clId="{06B55A28-D9D7-4806-A81C-4DFD3623E273}" dt="2025-02-06T12:02:41.161" v="360" actId="20577"/>
+        <pc:chgData name="Ocean Graham" userId="c784d4c6-724f-4452-8baf-8c216b3c246d" providerId="ADAL" clId="{06B55A28-D9D7-4806-A81C-4DFD3623E273}" dt="2025-02-10T09:00:53.278" v="452" actId="1076"/>
         <pc:sldMkLst>
           <pc:docMk/>
           <pc:sldMk cId="1767208876" sldId="260"/>
@@ -220,16 +217,8 @@
             <ac:spMk id="2" creationId="{33E3117C-949D-8E89-8BAB-81EC454D8633}"/>
           </ac:spMkLst>
         </pc:spChg>
-        <pc:spChg chg="del">
-          <ac:chgData name="Ocean Graham" userId="c784d4c6-724f-4452-8baf-8c216b3c246d" providerId="ADAL" clId="{06B55A28-D9D7-4806-A81C-4DFD3623E273}" dt="2025-02-06T12:01:27.330" v="219" actId="931"/>
-          <ac:spMkLst>
-            <pc:docMk/>
-            <pc:sldMk cId="1767208876" sldId="260"/>
-            <ac:spMk id="3" creationId="{D21A157A-8195-C7D7-6CA6-5FCDFFB94D00}"/>
-          </ac:spMkLst>
-        </pc:spChg>
         <pc:spChg chg="add mod">
-          <ac:chgData name="Ocean Graham" userId="c784d4c6-724f-4452-8baf-8c216b3c246d" providerId="ADAL" clId="{06B55A28-D9D7-4806-A81C-4DFD3623E273}" dt="2025-02-06T12:02:41.161" v="360" actId="20577"/>
+          <ac:chgData name="Ocean Graham" userId="c784d4c6-724f-4452-8baf-8c216b3c246d" providerId="ADAL" clId="{06B55A28-D9D7-4806-A81C-4DFD3623E273}" dt="2025-02-10T08:59:24.888" v="435" actId="20577"/>
           <ac:spMkLst>
             <pc:docMk/>
             <pc:sldMk cId="1767208876" sldId="260"/>
@@ -237,7 +226,15 @@
           </ac:spMkLst>
         </pc:spChg>
         <pc:picChg chg="add mod">
-          <ac:chgData name="Ocean Graham" userId="c784d4c6-724f-4452-8baf-8c216b3c246d" providerId="ADAL" clId="{06B55A28-D9D7-4806-A81C-4DFD3623E273}" dt="2025-02-06T12:01:29.527" v="222" actId="1076"/>
+          <ac:chgData name="Ocean Graham" userId="c784d4c6-724f-4452-8baf-8c216b3c246d" providerId="ADAL" clId="{06B55A28-D9D7-4806-A81C-4DFD3623E273}" dt="2025-02-10T09:00:22.135" v="442" actId="1076"/>
+          <ac:picMkLst>
+            <pc:docMk/>
+            <pc:sldMk cId="1767208876" sldId="260"/>
+            <ac:picMk id="4" creationId="{FCCF1D1E-11FF-B326-EB0D-CBB5E683F0BE}"/>
+          </ac:picMkLst>
+        </pc:picChg>
+        <pc:picChg chg="add mod">
+          <ac:chgData name="Ocean Graham" userId="c784d4c6-724f-4452-8baf-8c216b3c246d" providerId="ADAL" clId="{06B55A28-D9D7-4806-A81C-4DFD3623E273}" dt="2025-02-10T09:00:32.744" v="447" actId="14100"/>
           <ac:picMkLst>
             <pc:docMk/>
             <pc:sldMk cId="1767208876" sldId="260"/>
@@ -245,11 +242,19 @@
           </ac:picMkLst>
         </pc:picChg>
         <pc:picChg chg="add mod">
-          <ac:chgData name="Ocean Graham" userId="c784d4c6-724f-4452-8baf-8c216b3c246d" providerId="ADAL" clId="{06B55A28-D9D7-4806-A81C-4DFD3623E273}" dt="2025-02-06T12:02:03.034" v="226" actId="1076"/>
+          <ac:chgData name="Ocean Graham" userId="c784d4c6-724f-4452-8baf-8c216b3c246d" providerId="ADAL" clId="{06B55A28-D9D7-4806-A81C-4DFD3623E273}" dt="2025-02-10T08:59:32.576" v="438" actId="1076"/>
           <ac:picMkLst>
             <pc:docMk/>
             <pc:sldMk cId="1767208876" sldId="260"/>
             <ac:picMk id="7" creationId="{8E296CE2-72CA-580E-4914-F7EF048B9A2C}"/>
+          </ac:picMkLst>
+        </pc:picChg>
+        <pc:picChg chg="add mod">
+          <ac:chgData name="Ocean Graham" userId="c784d4c6-724f-4452-8baf-8c216b3c246d" providerId="ADAL" clId="{06B55A28-D9D7-4806-A81C-4DFD3623E273}" dt="2025-02-10T09:00:53.278" v="452" actId="1076"/>
+          <ac:picMkLst>
+            <pc:docMk/>
+            <pc:sldMk cId="1767208876" sldId="260"/>
+            <ac:picMk id="9" creationId="{6C7C4C5D-7600-3317-8C5E-DEBB2A72BD01}"/>
           </ac:picMkLst>
         </pc:picChg>
       </pc:sldChg>
@@ -405,7 +410,7 @@
           <a:p>
             <a:fld id="{A388D402-E577-4CEB-8AA4-5FC9D040EE40}" type="datetimeFigureOut">
               <a:rPr lang="en-GB" smtClean="0"/>
-              <a:t>06/02/2025</a:t>
+              <a:t>10/02/2025</a:t>
             </a:fld>
             <a:endParaRPr lang="en-GB"/>
           </a:p>
@@ -603,7 +608,7 @@
           <a:p>
             <a:fld id="{A388D402-E577-4CEB-8AA4-5FC9D040EE40}" type="datetimeFigureOut">
               <a:rPr lang="en-GB" smtClean="0"/>
-              <a:t>06/02/2025</a:t>
+              <a:t>10/02/2025</a:t>
             </a:fld>
             <a:endParaRPr lang="en-GB"/>
           </a:p>
@@ -811,7 +816,7 @@
           <a:p>
             <a:fld id="{A388D402-E577-4CEB-8AA4-5FC9D040EE40}" type="datetimeFigureOut">
               <a:rPr lang="en-GB" smtClean="0"/>
-              <a:t>06/02/2025</a:t>
+              <a:t>10/02/2025</a:t>
             </a:fld>
             <a:endParaRPr lang="en-GB"/>
           </a:p>
@@ -1009,7 +1014,7 @@
           <a:p>
             <a:fld id="{A388D402-E577-4CEB-8AA4-5FC9D040EE40}" type="datetimeFigureOut">
               <a:rPr lang="en-GB" smtClean="0"/>
-              <a:t>06/02/2025</a:t>
+              <a:t>10/02/2025</a:t>
             </a:fld>
             <a:endParaRPr lang="en-GB"/>
           </a:p>
@@ -1284,7 +1289,7 @@
           <a:p>
             <a:fld id="{A388D402-E577-4CEB-8AA4-5FC9D040EE40}" type="datetimeFigureOut">
               <a:rPr lang="en-GB" smtClean="0"/>
-              <a:t>06/02/2025</a:t>
+              <a:t>10/02/2025</a:t>
             </a:fld>
             <a:endParaRPr lang="en-GB"/>
           </a:p>
@@ -1549,7 +1554,7 @@
           <a:p>
             <a:fld id="{A388D402-E577-4CEB-8AA4-5FC9D040EE40}" type="datetimeFigureOut">
               <a:rPr lang="en-GB" smtClean="0"/>
-              <a:t>06/02/2025</a:t>
+              <a:t>10/02/2025</a:t>
             </a:fld>
             <a:endParaRPr lang="en-GB"/>
           </a:p>
@@ -1961,7 +1966,7 @@
           <a:p>
             <a:fld id="{A388D402-E577-4CEB-8AA4-5FC9D040EE40}" type="datetimeFigureOut">
               <a:rPr lang="en-GB" smtClean="0"/>
-              <a:t>06/02/2025</a:t>
+              <a:t>10/02/2025</a:t>
             </a:fld>
             <a:endParaRPr lang="en-GB"/>
           </a:p>
@@ -2102,7 +2107,7 @@
           <a:p>
             <a:fld id="{A388D402-E577-4CEB-8AA4-5FC9D040EE40}" type="datetimeFigureOut">
               <a:rPr lang="en-GB" smtClean="0"/>
-              <a:t>06/02/2025</a:t>
+              <a:t>10/02/2025</a:t>
             </a:fld>
             <a:endParaRPr lang="en-GB"/>
           </a:p>
@@ -2215,7 +2220,7 @@
           <a:p>
             <a:fld id="{A388D402-E577-4CEB-8AA4-5FC9D040EE40}" type="datetimeFigureOut">
               <a:rPr lang="en-GB" smtClean="0"/>
-              <a:t>06/02/2025</a:t>
+              <a:t>10/02/2025</a:t>
             </a:fld>
             <a:endParaRPr lang="en-GB"/>
           </a:p>
@@ -2526,7 +2531,7 @@
           <a:p>
             <a:fld id="{A388D402-E577-4CEB-8AA4-5FC9D040EE40}" type="datetimeFigureOut">
               <a:rPr lang="en-GB" smtClean="0"/>
-              <a:t>06/02/2025</a:t>
+              <a:t>10/02/2025</a:t>
             </a:fld>
             <a:endParaRPr lang="en-GB"/>
           </a:p>
@@ -2814,7 +2819,7 @@
           <a:p>
             <a:fld id="{A388D402-E577-4CEB-8AA4-5FC9D040EE40}" type="datetimeFigureOut">
               <a:rPr lang="en-GB" smtClean="0"/>
-              <a:t>06/02/2025</a:t>
+              <a:t>10/02/2025</a:t>
             </a:fld>
             <a:endParaRPr lang="en-GB"/>
           </a:p>
@@ -3055,7 +3060,7 @@
           <a:p>
             <a:fld id="{A388D402-E577-4CEB-8AA4-5FC9D040EE40}" type="datetimeFigureOut">
               <a:rPr lang="en-GB" smtClean="0"/>
-              <a:t>06/02/2025</a:t>
+              <a:t>10/02/2025</a:t>
             </a:fld>
             <a:endParaRPr lang="en-GB"/>
           </a:p>
@@ -3529,7 +3534,13 @@
           <a:p>
             <a:r>
               <a:rPr lang="en-GB" dirty="0"/>
-              <a:t>6/2/25</a:t>
+              <a:t>6/2/25 – 10/2/25</a:t>
+            </a:r>
+          </a:p>
+          <a:p>
+            <a:r>
+              <a:rPr lang="en-GB" dirty="0"/>
+              <a:t>Flowchart done 5/2/25</a:t>
             </a:r>
           </a:p>
         </p:txBody>
@@ -4303,8 +4314,8 @@
         </p:blipFill>
         <p:spPr>
           <a:xfrm>
-            <a:off x="742203" y="1690688"/>
-            <a:ext cx="5353797" cy="4105848"/>
+            <a:off x="1023559" y="1261708"/>
+            <a:ext cx="3543796" cy="2717751"/>
           </a:xfrm>
         </p:spPr>
       </p:pic>
@@ -4336,7 +4347,7 @@
         </p:blipFill>
         <p:spPr>
           <a:xfrm>
-            <a:off x="6265443" y="1715306"/>
+            <a:off x="6277754" y="770144"/>
             <a:ext cx="3543795" cy="2276793"/>
           </a:xfrm>
           <a:prstGeom prst="rect">
@@ -4359,7 +4370,7 @@
         <p:spPr>
           <a:xfrm>
             <a:off x="6096000" y="4403188"/>
-            <a:ext cx="5257800" cy="646331"/>
+            <a:ext cx="5257800" cy="1200329"/>
           </a:xfrm>
           <a:prstGeom prst="rect">
             <a:avLst/>
@@ -4374,15 +4385,89 @@
           <a:p>
             <a:r>
               <a:rPr lang="en-GB" dirty="0"/>
-              <a:t>Added a loop, to repeatedly ask rather and choose to end process when </a:t>
-            </a:r>
-            <a:r>
-              <a:rPr lang="en-GB"/>
-              <a:t>you desire to</a:t>
-            </a:r>
-          </a:p>
-        </p:txBody>
-      </p:sp>
+              <a:t>Added a loop, to repeatedly ask rather and choose to end process when you desire to</a:t>
+            </a:r>
+          </a:p>
+          <a:p>
+            <a:r>
+              <a:rPr lang="en-GB" dirty="0"/>
+              <a:t>Have to put finally before response so that it doesn’t repeat still</a:t>
+            </a:r>
+          </a:p>
+        </p:txBody>
+      </p:sp>
+      <p:pic>
+        <p:nvPicPr>
+          <p:cNvPr id="4" name="Picture 3" descr="A white background with blue text&#10;&#10;AI-generated content may be incorrect.">
+            <a:extLst>
+              <a:ext uri="{FF2B5EF4-FFF2-40B4-BE49-F238E27FC236}">
+                <a16:creationId xmlns:a16="http://schemas.microsoft.com/office/drawing/2014/main" id="{FCCF1D1E-11FF-B326-EB0D-CBB5E683F0BE}"/>
+              </a:ext>
+            </a:extLst>
+          </p:cNvPr>
+          <p:cNvPicPr>
+            <a:picLocks noChangeAspect="1"/>
+          </p:cNvPicPr>
+          <p:nvPr/>
+        </p:nvPicPr>
+        <p:blipFill>
+          <a:blip r:embed="rId4">
+            <a:extLst>
+              <a:ext uri="{28A0092B-C50C-407E-A947-70E740481C1C}">
+                <a14:useLocalDpi xmlns:a14="http://schemas.microsoft.com/office/drawing/2010/main" val="0"/>
+              </a:ext>
+            </a:extLst>
+          </a:blip>
+          <a:stretch>
+            <a:fillRect/>
+          </a:stretch>
+        </p:blipFill>
+        <p:spPr>
+          <a:xfrm>
+            <a:off x="6388072" y="3230133"/>
+            <a:ext cx="2848373" cy="885949"/>
+          </a:xfrm>
+          <a:prstGeom prst="rect">
+            <a:avLst/>
+          </a:prstGeom>
+        </p:spPr>
+      </p:pic>
+      <p:pic>
+        <p:nvPicPr>
+          <p:cNvPr id="9" name="Picture 8" descr="A screen shot of a computer code&#10;&#10;AI-generated content may be incorrect.">
+            <a:extLst>
+              <a:ext uri="{FF2B5EF4-FFF2-40B4-BE49-F238E27FC236}">
+                <a16:creationId xmlns:a16="http://schemas.microsoft.com/office/drawing/2014/main" id="{6C7C4C5D-7600-3317-8C5E-DEBB2A72BD01}"/>
+              </a:ext>
+            </a:extLst>
+          </p:cNvPr>
+          <p:cNvPicPr>
+            <a:picLocks noChangeAspect="1"/>
+          </p:cNvPicPr>
+          <p:nvPr/>
+        </p:nvPicPr>
+        <p:blipFill>
+          <a:blip r:embed="rId5">
+            <a:extLst>
+              <a:ext uri="{28A0092B-C50C-407E-A947-70E740481C1C}">
+                <a14:useLocalDpi xmlns:a14="http://schemas.microsoft.com/office/drawing/2010/main" val="0"/>
+              </a:ext>
+            </a:extLst>
+          </a:blip>
+          <a:stretch>
+            <a:fillRect/>
+          </a:stretch>
+        </p:blipFill>
+        <p:spPr>
+          <a:xfrm>
+            <a:off x="1176339" y="4116082"/>
+            <a:ext cx="3238236" cy="2525487"/>
+          </a:xfrm>
+          <a:prstGeom prst="rect">
+            <a:avLst/>
+          </a:prstGeom>
+        </p:spPr>
+      </p:pic>
     </p:spTree>
     <p:extLst>
       <p:ext uri="{BB962C8B-B14F-4D97-AF65-F5344CB8AC3E}">

</xml_diff>

<commit_message>
edits to screenshots, completion of both coding, beginning portfolio: In Uni
</commit_message>
<xml_diff>
--- a/403_Programming/assignments/palindromeprogress_screenshots.pptx
+++ b/403_Programming/assignments/palindromeprogress_screenshots.pptx
@@ -10,6 +10,8 @@
     <p:sldId id="258" r:id="rId4"/>
     <p:sldId id="259" r:id="rId5"/>
     <p:sldId id="260" r:id="rId6"/>
+    <p:sldId id="261" r:id="rId7"/>
+    <p:sldId id="262" r:id="rId8"/>
   </p:sldIdLst>
   <p:sldSz cx="12192000" cy="6858000"/>
   <p:notesSz cx="6858000" cy="9144000"/>
@@ -119,7 +121,7 @@
 <file path=ppt/revisionInfo.xml><?xml version="1.0" encoding="utf-8"?>
 <p1510:revInfo xmlns:a="http://schemas.openxmlformats.org/drawingml/2006/main" xmlns:r="http://schemas.openxmlformats.org/officeDocument/2006/relationships" xmlns:p1510="http://schemas.microsoft.com/office/powerpoint/2015/10/main">
   <p1510:revLst>
-    <p1510:client id="{06B55A28-D9D7-4806-A81C-4DFD3623E273}" v="10" dt="2025-02-10T09:00:47.215"/>
+    <p1510:client id="{06B55A28-D9D7-4806-A81C-4DFD3623E273}" v="15" dt="2025-02-12T11:07:39.049"/>
   </p1510:revLst>
 </p1510:revInfo>
 </file>
@@ -129,7 +131,7 @@
   <pc:docChgLst>
     <pc:chgData name="Ocean Graham" userId="c784d4c6-724f-4452-8baf-8c216b3c246d" providerId="ADAL" clId="{06B55A28-D9D7-4806-A81C-4DFD3623E273}"/>
     <pc:docChg chg="undo custSel addSld modSld">
-      <pc:chgData name="Ocean Graham" userId="c784d4c6-724f-4452-8baf-8c216b3c246d" providerId="ADAL" clId="{06B55A28-D9D7-4806-A81C-4DFD3623E273}" dt="2025-02-10T10:38:28.056" v="491" actId="20577"/>
+      <pc:chgData name="Ocean Graham" userId="c784d4c6-724f-4452-8baf-8c216b3c246d" providerId="ADAL" clId="{06B55A28-D9D7-4806-A81C-4DFD3623E273}" dt="2025-02-12T11:07:40.985" v="528" actId="1076"/>
       <pc:docMkLst>
         <pc:docMk/>
       </pc:docMkLst>
@@ -258,6 +260,92 @@
           </ac:picMkLst>
         </pc:picChg>
       </pc:sldChg>
+      <pc:sldChg chg="addSp delSp modSp new mod">
+        <pc:chgData name="Ocean Graham" userId="c784d4c6-724f-4452-8baf-8c216b3c246d" providerId="ADAL" clId="{06B55A28-D9D7-4806-A81C-4DFD3623E273}" dt="2025-02-12T11:00:52.030" v="508" actId="1076"/>
+        <pc:sldMkLst>
+          <pc:docMk/>
+          <pc:sldMk cId="2234453234" sldId="261"/>
+        </pc:sldMkLst>
+        <pc:spChg chg="mod">
+          <ac:chgData name="Ocean Graham" userId="c784d4c6-724f-4452-8baf-8c216b3c246d" providerId="ADAL" clId="{06B55A28-D9D7-4806-A81C-4DFD3623E273}" dt="2025-02-12T11:00:02.313" v="499" actId="20577"/>
+          <ac:spMkLst>
+            <pc:docMk/>
+            <pc:sldMk cId="2234453234" sldId="261"/>
+            <ac:spMk id="2" creationId="{2D6BDD22-133D-6A02-DC45-4ABA7CF429EF}"/>
+          </ac:spMkLst>
+        </pc:spChg>
+        <pc:spChg chg="del">
+          <ac:chgData name="Ocean Graham" userId="c784d4c6-724f-4452-8baf-8c216b3c246d" providerId="ADAL" clId="{06B55A28-D9D7-4806-A81C-4DFD3623E273}" dt="2025-02-12T11:00:12.644" v="500" actId="931"/>
+          <ac:spMkLst>
+            <pc:docMk/>
+            <pc:sldMk cId="2234453234" sldId="261"/>
+            <ac:spMk id="3" creationId="{030FCA98-4244-0524-1005-CAB2682DDB6B}"/>
+          </ac:spMkLst>
+        </pc:spChg>
+        <pc:picChg chg="add mod">
+          <ac:chgData name="Ocean Graham" userId="c784d4c6-724f-4452-8baf-8c216b3c246d" providerId="ADAL" clId="{06B55A28-D9D7-4806-A81C-4DFD3623E273}" dt="2025-02-12T11:00:16.893" v="504" actId="14100"/>
+          <ac:picMkLst>
+            <pc:docMk/>
+            <pc:sldMk cId="2234453234" sldId="261"/>
+            <ac:picMk id="5" creationId="{F6EB6FD4-C594-84BD-5925-B493CAF110DF}"/>
+          </ac:picMkLst>
+        </pc:picChg>
+        <pc:picChg chg="add mod">
+          <ac:chgData name="Ocean Graham" userId="c784d4c6-724f-4452-8baf-8c216b3c246d" providerId="ADAL" clId="{06B55A28-D9D7-4806-A81C-4DFD3623E273}" dt="2025-02-12T11:00:52.030" v="508" actId="1076"/>
+          <ac:picMkLst>
+            <pc:docMk/>
+            <pc:sldMk cId="2234453234" sldId="261"/>
+            <ac:picMk id="7" creationId="{66AF4CCE-0121-4F3A-269C-96DC8ADAD7DD}"/>
+          </ac:picMkLst>
+        </pc:picChg>
+      </pc:sldChg>
+      <pc:sldChg chg="addSp delSp modSp new mod">
+        <pc:chgData name="Ocean Graham" userId="c784d4c6-724f-4452-8baf-8c216b3c246d" providerId="ADAL" clId="{06B55A28-D9D7-4806-A81C-4DFD3623E273}" dt="2025-02-12T11:07:40.985" v="528" actId="1076"/>
+        <pc:sldMkLst>
+          <pc:docMk/>
+          <pc:sldMk cId="4289578756" sldId="262"/>
+        </pc:sldMkLst>
+        <pc:spChg chg="mod">
+          <ac:chgData name="Ocean Graham" userId="c784d4c6-724f-4452-8baf-8c216b3c246d" providerId="ADAL" clId="{06B55A28-D9D7-4806-A81C-4DFD3623E273}" dt="2025-02-12T11:06:19.469" v="516" actId="20577"/>
+          <ac:spMkLst>
+            <pc:docMk/>
+            <pc:sldMk cId="4289578756" sldId="262"/>
+            <ac:spMk id="2" creationId="{2FEE0094-3E4E-61C1-5A0F-9A59369FA256}"/>
+          </ac:spMkLst>
+        </pc:spChg>
+        <pc:spChg chg="del">
+          <ac:chgData name="Ocean Graham" userId="c784d4c6-724f-4452-8baf-8c216b3c246d" providerId="ADAL" clId="{06B55A28-D9D7-4806-A81C-4DFD3623E273}" dt="2025-02-12T11:06:45.280" v="517" actId="931"/>
+          <ac:spMkLst>
+            <pc:docMk/>
+            <pc:sldMk cId="4289578756" sldId="262"/>
+            <ac:spMk id="3" creationId="{11B05FC4-68A2-B907-7FC0-CD95D32081C1}"/>
+          </ac:spMkLst>
+        </pc:spChg>
+        <pc:picChg chg="add mod">
+          <ac:chgData name="Ocean Graham" userId="c784d4c6-724f-4452-8baf-8c216b3c246d" providerId="ADAL" clId="{06B55A28-D9D7-4806-A81C-4DFD3623E273}" dt="2025-02-12T11:06:47.190" v="520" actId="1076"/>
+          <ac:picMkLst>
+            <pc:docMk/>
+            <pc:sldMk cId="4289578756" sldId="262"/>
+            <ac:picMk id="5" creationId="{4F1B83DB-0631-F759-928A-3A19B8805058}"/>
+          </ac:picMkLst>
+        </pc:picChg>
+        <pc:picChg chg="add del mod">
+          <ac:chgData name="Ocean Graham" userId="c784d4c6-724f-4452-8baf-8c216b3c246d" providerId="ADAL" clId="{06B55A28-D9D7-4806-A81C-4DFD3623E273}" dt="2025-02-12T11:07:27.995" v="524" actId="21"/>
+          <ac:picMkLst>
+            <pc:docMk/>
+            <pc:sldMk cId="4289578756" sldId="262"/>
+            <ac:picMk id="7" creationId="{FD31407A-9386-2A18-990C-640961A933B8}"/>
+          </ac:picMkLst>
+        </pc:picChg>
+        <pc:picChg chg="add mod">
+          <ac:chgData name="Ocean Graham" userId="c784d4c6-724f-4452-8baf-8c216b3c246d" providerId="ADAL" clId="{06B55A28-D9D7-4806-A81C-4DFD3623E273}" dt="2025-02-12T11:07:40.985" v="528" actId="1076"/>
+          <ac:picMkLst>
+            <pc:docMk/>
+            <pc:sldMk cId="4289578756" sldId="262"/>
+            <ac:picMk id="9" creationId="{B09AF113-893A-E4B5-CDF8-7F5A4B92C780}"/>
+          </ac:picMkLst>
+        </pc:picChg>
+      </pc:sldChg>
     </pc:docChg>
   </pc:docChgLst>
 </pc:chgInfo>
@@ -410,7 +498,7 @@
           <a:p>
             <a:fld id="{A388D402-E577-4CEB-8AA4-5FC9D040EE40}" type="datetimeFigureOut">
               <a:rPr lang="en-GB" smtClean="0"/>
-              <a:t>10/02/2025</a:t>
+              <a:t>12/02/2025</a:t>
             </a:fld>
             <a:endParaRPr lang="en-GB"/>
           </a:p>
@@ -608,7 +696,7 @@
           <a:p>
             <a:fld id="{A388D402-E577-4CEB-8AA4-5FC9D040EE40}" type="datetimeFigureOut">
               <a:rPr lang="en-GB" smtClean="0"/>
-              <a:t>10/02/2025</a:t>
+              <a:t>12/02/2025</a:t>
             </a:fld>
             <a:endParaRPr lang="en-GB"/>
           </a:p>
@@ -816,7 +904,7 @@
           <a:p>
             <a:fld id="{A388D402-E577-4CEB-8AA4-5FC9D040EE40}" type="datetimeFigureOut">
               <a:rPr lang="en-GB" smtClean="0"/>
-              <a:t>10/02/2025</a:t>
+              <a:t>12/02/2025</a:t>
             </a:fld>
             <a:endParaRPr lang="en-GB"/>
           </a:p>
@@ -1014,7 +1102,7 @@
           <a:p>
             <a:fld id="{A388D402-E577-4CEB-8AA4-5FC9D040EE40}" type="datetimeFigureOut">
               <a:rPr lang="en-GB" smtClean="0"/>
-              <a:t>10/02/2025</a:t>
+              <a:t>12/02/2025</a:t>
             </a:fld>
             <a:endParaRPr lang="en-GB"/>
           </a:p>
@@ -1289,7 +1377,7 @@
           <a:p>
             <a:fld id="{A388D402-E577-4CEB-8AA4-5FC9D040EE40}" type="datetimeFigureOut">
               <a:rPr lang="en-GB" smtClean="0"/>
-              <a:t>10/02/2025</a:t>
+              <a:t>12/02/2025</a:t>
             </a:fld>
             <a:endParaRPr lang="en-GB"/>
           </a:p>
@@ -1554,7 +1642,7 @@
           <a:p>
             <a:fld id="{A388D402-E577-4CEB-8AA4-5FC9D040EE40}" type="datetimeFigureOut">
               <a:rPr lang="en-GB" smtClean="0"/>
-              <a:t>10/02/2025</a:t>
+              <a:t>12/02/2025</a:t>
             </a:fld>
             <a:endParaRPr lang="en-GB"/>
           </a:p>
@@ -1966,7 +2054,7 @@
           <a:p>
             <a:fld id="{A388D402-E577-4CEB-8AA4-5FC9D040EE40}" type="datetimeFigureOut">
               <a:rPr lang="en-GB" smtClean="0"/>
-              <a:t>10/02/2025</a:t>
+              <a:t>12/02/2025</a:t>
             </a:fld>
             <a:endParaRPr lang="en-GB"/>
           </a:p>
@@ -2107,7 +2195,7 @@
           <a:p>
             <a:fld id="{A388D402-E577-4CEB-8AA4-5FC9D040EE40}" type="datetimeFigureOut">
               <a:rPr lang="en-GB" smtClean="0"/>
-              <a:t>10/02/2025</a:t>
+              <a:t>12/02/2025</a:t>
             </a:fld>
             <a:endParaRPr lang="en-GB"/>
           </a:p>
@@ -2220,7 +2308,7 @@
           <a:p>
             <a:fld id="{A388D402-E577-4CEB-8AA4-5FC9D040EE40}" type="datetimeFigureOut">
               <a:rPr lang="en-GB" smtClean="0"/>
-              <a:t>10/02/2025</a:t>
+              <a:t>12/02/2025</a:t>
             </a:fld>
             <a:endParaRPr lang="en-GB"/>
           </a:p>
@@ -2531,7 +2619,7 @@
           <a:p>
             <a:fld id="{A388D402-E577-4CEB-8AA4-5FC9D040EE40}" type="datetimeFigureOut">
               <a:rPr lang="en-GB" smtClean="0"/>
-              <a:t>10/02/2025</a:t>
+              <a:t>12/02/2025</a:t>
             </a:fld>
             <a:endParaRPr lang="en-GB"/>
           </a:p>
@@ -2819,7 +2907,7 @@
           <a:p>
             <a:fld id="{A388D402-E577-4CEB-8AA4-5FC9D040EE40}" type="datetimeFigureOut">
               <a:rPr lang="en-GB" smtClean="0"/>
-              <a:t>10/02/2025</a:t>
+              <a:t>12/02/2025</a:t>
             </a:fld>
             <a:endParaRPr lang="en-GB"/>
           </a:p>
@@ -3060,7 +3148,7 @@
           <a:p>
             <a:fld id="{A388D402-E577-4CEB-8AA4-5FC9D040EE40}" type="datetimeFigureOut">
               <a:rPr lang="en-GB" smtClean="0"/>
-              <a:t>10/02/2025</a:t>
+              <a:t>12/02/2025</a:t>
             </a:fld>
             <a:endParaRPr lang="en-GB"/>
           </a:p>
@@ -4472,6 +4560,264 @@
     <p:extLst>
       <p:ext uri="{BB962C8B-B14F-4D97-AF65-F5344CB8AC3E}">
         <p14:creationId xmlns:p14="http://schemas.microsoft.com/office/powerpoint/2010/main" val="1767208876"/>
+      </p:ext>
+    </p:extLst>
+  </p:cSld>
+  <p:clrMapOvr>
+    <a:masterClrMapping/>
+  </p:clrMapOvr>
+</p:sld>
+</file>
+
+<file path=ppt/slides/slide6.xml><?xml version="1.0" encoding="utf-8"?>
+<p:sld xmlns:a="http://schemas.openxmlformats.org/drawingml/2006/main" xmlns:r="http://schemas.openxmlformats.org/officeDocument/2006/relationships" xmlns:p="http://schemas.openxmlformats.org/presentationml/2006/main">
+  <p:cSld>
+    <p:spTree>
+      <p:nvGrpSpPr>
+        <p:cNvPr id="1" name=""/>
+        <p:cNvGrpSpPr/>
+        <p:nvPr/>
+      </p:nvGrpSpPr>
+      <p:grpSpPr>
+        <a:xfrm>
+          <a:off x="0" y="0"/>
+          <a:ext cx="0" cy="0"/>
+          <a:chOff x="0" y="0"/>
+          <a:chExt cx="0" cy="0"/>
+        </a:xfrm>
+      </p:grpSpPr>
+      <p:sp>
+        <p:nvSpPr>
+          <p:cNvPr id="2" name="Title 1">
+            <a:extLst>
+              <a:ext uri="{FF2B5EF4-FFF2-40B4-BE49-F238E27FC236}">
+                <a16:creationId xmlns:a16="http://schemas.microsoft.com/office/drawing/2014/main" id="{2D6BDD22-133D-6A02-DC45-4ABA7CF429EF}"/>
+              </a:ext>
+            </a:extLst>
+          </p:cNvPr>
+          <p:cNvSpPr>
+            <a:spLocks noGrp="1"/>
+          </p:cNvSpPr>
+          <p:nvPr>
+            <p:ph type="title"/>
+          </p:nvPr>
+        </p:nvSpPr>
+        <p:spPr/>
+        <p:txBody>
+          <a:bodyPr/>
+          <a:lstStyle/>
+          <a:p>
+            <a:r>
+              <a:rPr lang="en-GB" dirty="0"/>
+              <a:t>12/2/25</a:t>
+            </a:r>
+          </a:p>
+        </p:txBody>
+      </p:sp>
+      <p:pic>
+        <p:nvPicPr>
+          <p:cNvPr id="5" name="Content Placeholder 4" descr="A screenshot of a computer code&#10;&#10;AI-generated content may be incorrect.">
+            <a:extLst>
+              <a:ext uri="{FF2B5EF4-FFF2-40B4-BE49-F238E27FC236}">
+                <a16:creationId xmlns:a16="http://schemas.microsoft.com/office/drawing/2014/main" id="{F6EB6FD4-C594-84BD-5925-B493CAF110DF}"/>
+              </a:ext>
+            </a:extLst>
+          </p:cNvPr>
+          <p:cNvPicPr>
+            <a:picLocks noGrp="1" noChangeAspect="1"/>
+          </p:cNvPicPr>
+          <p:nvPr>
+            <p:ph idx="1"/>
+          </p:nvPr>
+        </p:nvPicPr>
+        <p:blipFill>
+          <a:blip r:embed="rId2">
+            <a:extLst>
+              <a:ext uri="{28A0092B-C50C-407E-A947-70E740481C1C}">
+                <a14:useLocalDpi xmlns:a14="http://schemas.microsoft.com/office/drawing/2010/main" val="0"/>
+              </a:ext>
+            </a:extLst>
+          </a:blip>
+          <a:stretch>
+            <a:fillRect/>
+          </a:stretch>
+        </p:blipFill>
+        <p:spPr>
+          <a:xfrm>
+            <a:off x="296816" y="1403595"/>
+            <a:ext cx="5464643" cy="3702977"/>
+          </a:xfrm>
+        </p:spPr>
+      </p:pic>
+      <p:pic>
+        <p:nvPicPr>
+          <p:cNvPr id="7" name="Picture 6" descr="A screenshot of a computer&#10;&#10;AI-generated content may be incorrect.">
+            <a:extLst>
+              <a:ext uri="{FF2B5EF4-FFF2-40B4-BE49-F238E27FC236}">
+                <a16:creationId xmlns:a16="http://schemas.microsoft.com/office/drawing/2014/main" id="{66AF4CCE-0121-4F3A-269C-96DC8ADAD7DD}"/>
+              </a:ext>
+            </a:extLst>
+          </p:cNvPr>
+          <p:cNvPicPr>
+            <a:picLocks noChangeAspect="1"/>
+          </p:cNvPicPr>
+          <p:nvPr/>
+        </p:nvPicPr>
+        <p:blipFill>
+          <a:blip r:embed="rId3">
+            <a:extLst>
+              <a:ext uri="{28A0092B-C50C-407E-A947-70E740481C1C}">
+                <a14:useLocalDpi xmlns:a14="http://schemas.microsoft.com/office/drawing/2010/main" val="0"/>
+              </a:ext>
+            </a:extLst>
+          </a:blip>
+          <a:stretch>
+            <a:fillRect/>
+          </a:stretch>
+        </p:blipFill>
+        <p:spPr>
+          <a:xfrm>
+            <a:off x="6302843" y="1435554"/>
+            <a:ext cx="4477375" cy="1819529"/>
+          </a:xfrm>
+          <a:prstGeom prst="rect">
+            <a:avLst/>
+          </a:prstGeom>
+        </p:spPr>
+      </p:pic>
+    </p:spTree>
+    <p:extLst>
+      <p:ext uri="{BB962C8B-B14F-4D97-AF65-F5344CB8AC3E}">
+        <p14:creationId xmlns:p14="http://schemas.microsoft.com/office/powerpoint/2010/main" val="2234453234"/>
+      </p:ext>
+    </p:extLst>
+  </p:cSld>
+  <p:clrMapOvr>
+    <a:masterClrMapping/>
+  </p:clrMapOvr>
+</p:sld>
+</file>
+
+<file path=ppt/slides/slide7.xml><?xml version="1.0" encoding="utf-8"?>
+<p:sld xmlns:a="http://schemas.openxmlformats.org/drawingml/2006/main" xmlns:r="http://schemas.openxmlformats.org/officeDocument/2006/relationships" xmlns:p="http://schemas.openxmlformats.org/presentationml/2006/main">
+  <p:cSld>
+    <p:spTree>
+      <p:nvGrpSpPr>
+        <p:cNvPr id="1" name=""/>
+        <p:cNvGrpSpPr/>
+        <p:nvPr/>
+      </p:nvGrpSpPr>
+      <p:grpSpPr>
+        <a:xfrm>
+          <a:off x="0" y="0"/>
+          <a:ext cx="0" cy="0"/>
+          <a:chOff x="0" y="0"/>
+          <a:chExt cx="0" cy="0"/>
+        </a:xfrm>
+      </p:grpSpPr>
+      <p:sp>
+        <p:nvSpPr>
+          <p:cNvPr id="2" name="Title 1">
+            <a:extLst>
+              <a:ext uri="{FF2B5EF4-FFF2-40B4-BE49-F238E27FC236}">
+                <a16:creationId xmlns:a16="http://schemas.microsoft.com/office/drawing/2014/main" id="{2FEE0094-3E4E-61C1-5A0F-9A59369FA256}"/>
+              </a:ext>
+            </a:extLst>
+          </p:cNvPr>
+          <p:cNvSpPr>
+            <a:spLocks noGrp="1"/>
+          </p:cNvSpPr>
+          <p:nvPr>
+            <p:ph type="title"/>
+          </p:nvPr>
+        </p:nvSpPr>
+        <p:spPr/>
+        <p:txBody>
+          <a:bodyPr/>
+          <a:lstStyle/>
+          <a:p>
+            <a:r>
+              <a:rPr lang="en-GB" dirty="0"/>
+              <a:t>12/2/25</a:t>
+            </a:r>
+          </a:p>
+        </p:txBody>
+      </p:sp>
+      <p:pic>
+        <p:nvPicPr>
+          <p:cNvPr id="5" name="Content Placeholder 4" descr="A screenshot of a computer screen&#10;&#10;AI-generated content may be incorrect.">
+            <a:extLst>
+              <a:ext uri="{FF2B5EF4-FFF2-40B4-BE49-F238E27FC236}">
+                <a16:creationId xmlns:a16="http://schemas.microsoft.com/office/drawing/2014/main" id="{4F1B83DB-0631-F759-928A-3A19B8805058}"/>
+              </a:ext>
+            </a:extLst>
+          </p:cNvPr>
+          <p:cNvPicPr>
+            <a:picLocks noGrp="1" noChangeAspect="1"/>
+          </p:cNvPicPr>
+          <p:nvPr>
+            <p:ph idx="1"/>
+          </p:nvPr>
+        </p:nvPicPr>
+        <p:blipFill>
+          <a:blip r:embed="rId2">
+            <a:extLst>
+              <a:ext uri="{28A0092B-C50C-407E-A947-70E740481C1C}">
+                <a14:useLocalDpi xmlns:a14="http://schemas.microsoft.com/office/drawing/2010/main" val="0"/>
+              </a:ext>
+            </a:extLst>
+          </a:blip>
+          <a:stretch>
+            <a:fillRect/>
+          </a:stretch>
+        </p:blipFill>
+        <p:spPr>
+          <a:xfrm>
+            <a:off x="8140989" y="1761892"/>
+            <a:ext cx="3562847" cy="3334215"/>
+          </a:xfrm>
+        </p:spPr>
+      </p:pic>
+      <p:pic>
+        <p:nvPicPr>
+          <p:cNvPr id="9" name="Picture 8" descr="A screenshot of a computer code&#10;&#10;AI-generated content may be incorrect.">
+            <a:extLst>
+              <a:ext uri="{FF2B5EF4-FFF2-40B4-BE49-F238E27FC236}">
+                <a16:creationId xmlns:a16="http://schemas.microsoft.com/office/drawing/2014/main" id="{B09AF113-893A-E4B5-CDF8-7F5A4B92C780}"/>
+              </a:ext>
+            </a:extLst>
+          </p:cNvPr>
+          <p:cNvPicPr>
+            <a:picLocks noChangeAspect="1"/>
+          </p:cNvPicPr>
+          <p:nvPr/>
+        </p:nvPicPr>
+        <p:blipFill>
+          <a:blip r:embed="rId3">
+            <a:extLst>
+              <a:ext uri="{28A0092B-C50C-407E-A947-70E740481C1C}">
+                <a14:useLocalDpi xmlns:a14="http://schemas.microsoft.com/office/drawing/2010/main" val="0"/>
+              </a:ext>
+            </a:extLst>
+          </a:blip>
+          <a:stretch>
+            <a:fillRect/>
+          </a:stretch>
+        </p:blipFill>
+        <p:spPr>
+          <a:xfrm>
+            <a:off x="119043" y="1524283"/>
+            <a:ext cx="7621064" cy="4344006"/>
+          </a:xfrm>
+          <a:prstGeom prst="rect">
+            <a:avLst/>
+          </a:prstGeom>
+        </p:spPr>
+      </p:pic>
+    </p:spTree>
+    <p:extLst>
+      <p:ext uri="{BB962C8B-B14F-4D97-AF65-F5344CB8AC3E}">
+        <p14:creationId xmlns:p14="http://schemas.microsoft.com/office/powerpoint/2010/main" val="4289578756"/>
       </p:ext>
     </p:extLst>
   </p:cSld>

</xml_diff>

<commit_message>
Portfolio only needs conclusion finishing and finetuning, test table added, edits to screenshots
</commit_message>
<xml_diff>
--- a/403_Programming/assignments/palindromeprogress_screenshots.pptx
+++ b/403_Programming/assignments/palindromeprogress_screenshots.pptx
@@ -498,7 +498,7 @@
           <a:p>
             <a:fld id="{A388D402-E577-4CEB-8AA4-5FC9D040EE40}" type="datetimeFigureOut">
               <a:rPr lang="en-GB" smtClean="0"/>
-              <a:t>12/02/2025</a:t>
+              <a:t>19/02/2025</a:t>
             </a:fld>
             <a:endParaRPr lang="en-GB"/>
           </a:p>
@@ -696,7 +696,7 @@
           <a:p>
             <a:fld id="{A388D402-E577-4CEB-8AA4-5FC9D040EE40}" type="datetimeFigureOut">
               <a:rPr lang="en-GB" smtClean="0"/>
-              <a:t>12/02/2025</a:t>
+              <a:t>19/02/2025</a:t>
             </a:fld>
             <a:endParaRPr lang="en-GB"/>
           </a:p>
@@ -904,7 +904,7 @@
           <a:p>
             <a:fld id="{A388D402-E577-4CEB-8AA4-5FC9D040EE40}" type="datetimeFigureOut">
               <a:rPr lang="en-GB" smtClean="0"/>
-              <a:t>12/02/2025</a:t>
+              <a:t>19/02/2025</a:t>
             </a:fld>
             <a:endParaRPr lang="en-GB"/>
           </a:p>
@@ -1102,7 +1102,7 @@
           <a:p>
             <a:fld id="{A388D402-E577-4CEB-8AA4-5FC9D040EE40}" type="datetimeFigureOut">
               <a:rPr lang="en-GB" smtClean="0"/>
-              <a:t>12/02/2025</a:t>
+              <a:t>19/02/2025</a:t>
             </a:fld>
             <a:endParaRPr lang="en-GB"/>
           </a:p>
@@ -1377,7 +1377,7 @@
           <a:p>
             <a:fld id="{A388D402-E577-4CEB-8AA4-5FC9D040EE40}" type="datetimeFigureOut">
               <a:rPr lang="en-GB" smtClean="0"/>
-              <a:t>12/02/2025</a:t>
+              <a:t>19/02/2025</a:t>
             </a:fld>
             <a:endParaRPr lang="en-GB"/>
           </a:p>
@@ -1642,7 +1642,7 @@
           <a:p>
             <a:fld id="{A388D402-E577-4CEB-8AA4-5FC9D040EE40}" type="datetimeFigureOut">
               <a:rPr lang="en-GB" smtClean="0"/>
-              <a:t>12/02/2025</a:t>
+              <a:t>19/02/2025</a:t>
             </a:fld>
             <a:endParaRPr lang="en-GB"/>
           </a:p>
@@ -2054,7 +2054,7 @@
           <a:p>
             <a:fld id="{A388D402-E577-4CEB-8AA4-5FC9D040EE40}" type="datetimeFigureOut">
               <a:rPr lang="en-GB" smtClean="0"/>
-              <a:t>12/02/2025</a:t>
+              <a:t>19/02/2025</a:t>
             </a:fld>
             <a:endParaRPr lang="en-GB"/>
           </a:p>
@@ -2195,7 +2195,7 @@
           <a:p>
             <a:fld id="{A388D402-E577-4CEB-8AA4-5FC9D040EE40}" type="datetimeFigureOut">
               <a:rPr lang="en-GB" smtClean="0"/>
-              <a:t>12/02/2025</a:t>
+              <a:t>19/02/2025</a:t>
             </a:fld>
             <a:endParaRPr lang="en-GB"/>
           </a:p>
@@ -2308,7 +2308,7 @@
           <a:p>
             <a:fld id="{A388D402-E577-4CEB-8AA4-5FC9D040EE40}" type="datetimeFigureOut">
               <a:rPr lang="en-GB" smtClean="0"/>
-              <a:t>12/02/2025</a:t>
+              <a:t>19/02/2025</a:t>
             </a:fld>
             <a:endParaRPr lang="en-GB"/>
           </a:p>
@@ -2619,7 +2619,7 @@
           <a:p>
             <a:fld id="{A388D402-E577-4CEB-8AA4-5FC9D040EE40}" type="datetimeFigureOut">
               <a:rPr lang="en-GB" smtClean="0"/>
-              <a:t>12/02/2025</a:t>
+              <a:t>19/02/2025</a:t>
             </a:fld>
             <a:endParaRPr lang="en-GB"/>
           </a:p>
@@ -2907,7 +2907,7 @@
           <a:p>
             <a:fld id="{A388D402-E577-4CEB-8AA4-5FC9D040EE40}" type="datetimeFigureOut">
               <a:rPr lang="en-GB" smtClean="0"/>
-              <a:t>12/02/2025</a:t>
+              <a:t>19/02/2025</a:t>
             </a:fld>
             <a:endParaRPr lang="en-GB"/>
           </a:p>
@@ -3148,7 +3148,7 @@
           <a:p>
             <a:fld id="{A388D402-E577-4CEB-8AA4-5FC9D040EE40}" type="datetimeFigureOut">
               <a:rPr lang="en-GB" smtClean="0"/>
-              <a:t>12/02/2025</a:t>
+              <a:t>19/02/2025</a:t>
             </a:fld>
             <a:endParaRPr lang="en-GB"/>
           </a:p>
@@ -4058,6 +4058,41 @@
           </a:p>
         </p:txBody>
       </p:sp>
+      <p:sp>
+        <p:nvSpPr>
+          <p:cNvPr id="3" name="TextBox 2">
+            <a:extLst>
+              <a:ext uri="{FF2B5EF4-FFF2-40B4-BE49-F238E27FC236}">
+                <a16:creationId xmlns:a16="http://schemas.microsoft.com/office/drawing/2014/main" id="{765D5E40-6D23-D063-AD04-078516C0DB7F}"/>
+              </a:ext>
+            </a:extLst>
+          </p:cNvPr>
+          <p:cNvSpPr txBox="1"/>
+          <p:nvPr/>
+        </p:nvSpPr>
+        <p:spPr>
+          <a:xfrm>
+            <a:off x="5669280" y="3063240"/>
+            <a:ext cx="5568696" cy="646331"/>
+          </a:xfrm>
+          <a:prstGeom prst="rect">
+            <a:avLst/>
+          </a:prstGeom>
+          <a:noFill/>
+        </p:spPr>
+        <p:txBody>
+          <a:bodyPr wrap="square" rtlCol="0">
+            <a:spAutoFit/>
+          </a:bodyPr>
+          <a:lstStyle/>
+          <a:p>
+            <a:r>
+              <a:rPr lang="en-GB" dirty="0"/>
+              <a:t>For letter in word, checks the characters in word for alphabet letters, if not then it removes them</a:t>
+            </a:r>
+          </a:p>
+        </p:txBody>
+      </p:sp>
     </p:spTree>
     <p:extLst>
       <p:ext uri="{BB962C8B-B14F-4D97-AF65-F5344CB8AC3E}">
@@ -4185,7 +4220,7 @@
         </p:blipFill>
         <p:spPr>
           <a:xfrm>
-            <a:off x="7335591" y="1527476"/>
+            <a:off x="7006301" y="1923769"/>
             <a:ext cx="2991267" cy="804995"/>
           </a:xfrm>
           <a:prstGeom prst="rect">
@@ -4257,7 +4292,7 @@
         </p:blipFill>
         <p:spPr>
           <a:xfrm>
-            <a:off x="7644028" y="2742242"/>
+            <a:off x="6752875" y="4689518"/>
             <a:ext cx="2886478" cy="752580"/>
           </a:xfrm>
           <a:prstGeom prst="rect">
@@ -4279,7 +4314,7 @@
         </p:nvSpPr>
         <p:spPr>
           <a:xfrm>
-            <a:off x="5472332" y="4009292"/>
+            <a:off x="6593058" y="5604898"/>
             <a:ext cx="5598942" cy="646331"/>
           </a:xfrm>
           <a:prstGeom prst="rect">
@@ -4302,6 +4337,76 @@
             <a:r>
               <a:rPr lang="en-GB" dirty="0"/>
               <a:t>Added .lower to solve</a:t>
+            </a:r>
+          </a:p>
+        </p:txBody>
+      </p:sp>
+      <p:sp>
+        <p:nvSpPr>
+          <p:cNvPr id="4" name="TextBox 3">
+            <a:extLst>
+              <a:ext uri="{FF2B5EF4-FFF2-40B4-BE49-F238E27FC236}">
+                <a16:creationId xmlns:a16="http://schemas.microsoft.com/office/drawing/2014/main" id="{DC5E08AB-4CB5-7C6A-2896-F2DC0C2A02FE}"/>
+              </a:ext>
+            </a:extLst>
+          </p:cNvPr>
+          <p:cNvSpPr txBox="1"/>
+          <p:nvPr/>
+        </p:nvSpPr>
+        <p:spPr>
+          <a:xfrm>
+            <a:off x="219104" y="3624710"/>
+            <a:ext cx="11271504" cy="369332"/>
+          </a:xfrm>
+          <a:prstGeom prst="rect">
+            <a:avLst/>
+          </a:prstGeom>
+          <a:noFill/>
+        </p:spPr>
+        <p:txBody>
+          <a:bodyPr wrap="square" rtlCol="0">
+            <a:spAutoFit/>
+          </a:bodyPr>
+          <a:lstStyle/>
+          <a:p>
+            <a:r>
+              <a:rPr lang="en-GB" dirty="0"/>
+              <a:t>--------------------------------------------------------------------------------------------------------------------------------------------</a:t>
+            </a:r>
+          </a:p>
+        </p:txBody>
+      </p:sp>
+      <p:sp>
+        <p:nvSpPr>
+          <p:cNvPr id="6" name="TextBox 5">
+            <a:extLst>
+              <a:ext uri="{FF2B5EF4-FFF2-40B4-BE49-F238E27FC236}">
+                <a16:creationId xmlns:a16="http://schemas.microsoft.com/office/drawing/2014/main" id="{CA5E2943-602F-9C83-0009-73091523AD7C}"/>
+              </a:ext>
+            </a:extLst>
+          </p:cNvPr>
+          <p:cNvSpPr txBox="1"/>
+          <p:nvPr/>
+        </p:nvSpPr>
+        <p:spPr>
+          <a:xfrm>
+            <a:off x="4860525" y="3940916"/>
+            <a:ext cx="1189813" cy="369332"/>
+          </a:xfrm>
+          <a:prstGeom prst="rect">
+            <a:avLst/>
+          </a:prstGeom>
+          <a:noFill/>
+        </p:spPr>
+        <p:txBody>
+          <a:bodyPr wrap="none" rtlCol="0">
+            <a:spAutoFit/>
+          </a:bodyPr>
+          <a:lstStyle/>
+          <a:p>
+            <a:r>
+              <a:rPr lang="en-GB" dirty="0"/>
+              <a:t>resolution</a:t>
             </a:r>
           </a:p>
         </p:txBody>
@@ -4352,7 +4457,12 @@
             <p:ph type="title"/>
           </p:nvPr>
         </p:nvSpPr>
-        <p:spPr/>
+        <p:spPr>
+          <a:xfrm>
+            <a:off x="838200" y="216431"/>
+            <a:ext cx="10515600" cy="1325563"/>
+          </a:xfrm>
+        </p:spPr>
         <p:txBody>
           <a:bodyPr/>
           <a:lstStyle/>
@@ -4402,7 +4512,7 @@
         </p:blipFill>
         <p:spPr>
           <a:xfrm>
-            <a:off x="1023559" y="1261708"/>
+            <a:off x="1438727" y="3861403"/>
             <a:ext cx="3543796" cy="2717751"/>
           </a:xfrm>
         </p:spPr>
@@ -4435,7 +4545,7 @@
         </p:blipFill>
         <p:spPr>
           <a:xfrm>
-            <a:off x="6277754" y="770144"/>
+            <a:off x="6096000" y="3212608"/>
             <a:ext cx="3543795" cy="2276793"/>
           </a:xfrm>
           <a:prstGeom prst="rect">
@@ -4457,7 +4567,7 @@
         </p:nvSpPr>
         <p:spPr>
           <a:xfrm>
-            <a:off x="6096000" y="4403188"/>
+            <a:off x="5925312" y="5441240"/>
             <a:ext cx="5257800" cy="1200329"/>
           </a:xfrm>
           <a:prstGeom prst="rect">
@@ -4512,7 +4622,7 @@
         </p:blipFill>
         <p:spPr>
           <a:xfrm>
-            <a:off x="6388072" y="3230133"/>
+            <a:off x="6256192" y="1308025"/>
             <a:ext cx="2848373" cy="885949"/>
           </a:xfrm>
           <a:prstGeom prst="rect">
@@ -4548,7 +4658,7 @@
         </p:blipFill>
         <p:spPr>
           <a:xfrm>
-            <a:off x="1176339" y="4116082"/>
+            <a:off x="1517778" y="1188796"/>
             <a:ext cx="3238236" cy="2525487"/>
           </a:xfrm>
           <a:prstGeom prst="rect">
@@ -4556,6 +4666,76 @@
           </a:prstGeom>
         </p:spPr>
       </p:pic>
+      <p:sp>
+        <p:nvSpPr>
+          <p:cNvPr id="6" name="TextBox 5">
+            <a:extLst>
+              <a:ext uri="{FF2B5EF4-FFF2-40B4-BE49-F238E27FC236}">
+                <a16:creationId xmlns:a16="http://schemas.microsoft.com/office/drawing/2014/main" id="{21984241-7F1F-5BF9-AD65-0928FD8E7534}"/>
+              </a:ext>
+            </a:extLst>
+          </p:cNvPr>
+          <p:cNvSpPr txBox="1"/>
+          <p:nvPr/>
+        </p:nvSpPr>
+        <p:spPr>
+          <a:xfrm>
+            <a:off x="5989320" y="2415685"/>
+            <a:ext cx="5193792" cy="646331"/>
+          </a:xfrm>
+          <a:prstGeom prst="rect">
+            <a:avLst/>
+          </a:prstGeom>
+          <a:noFill/>
+        </p:spPr>
+        <p:txBody>
+          <a:bodyPr wrap="square" rtlCol="0">
+            <a:spAutoFit/>
+          </a:bodyPr>
+          <a:lstStyle/>
+          <a:p>
+            <a:r>
+              <a:rPr lang="en-GB" dirty="0"/>
+              <a:t>Issues with q for quit not working resolved, moved the q for quit block up</a:t>
+            </a:r>
+          </a:p>
+        </p:txBody>
+      </p:sp>
+      <p:sp>
+        <p:nvSpPr>
+          <p:cNvPr id="10" name="TextBox 9">
+            <a:extLst>
+              <a:ext uri="{FF2B5EF4-FFF2-40B4-BE49-F238E27FC236}">
+                <a16:creationId xmlns:a16="http://schemas.microsoft.com/office/drawing/2014/main" id="{847A0B39-82E7-CA34-2874-7FB45F0081C5}"/>
+              </a:ext>
+            </a:extLst>
+          </p:cNvPr>
+          <p:cNvSpPr txBox="1"/>
+          <p:nvPr/>
+        </p:nvSpPr>
+        <p:spPr>
+          <a:xfrm>
+            <a:off x="513145" y="3574836"/>
+            <a:ext cx="5394960" cy="369332"/>
+          </a:xfrm>
+          <a:prstGeom prst="rect">
+            <a:avLst/>
+          </a:prstGeom>
+          <a:noFill/>
+        </p:spPr>
+        <p:txBody>
+          <a:bodyPr wrap="square" rtlCol="0">
+            <a:spAutoFit/>
+          </a:bodyPr>
+          <a:lstStyle/>
+          <a:p>
+            <a:r>
+              <a:rPr lang="en-GB" dirty="0"/>
+              <a:t>------------------------------------------------------------------</a:t>
+            </a:r>
+          </a:p>
+        </p:txBody>
+      </p:sp>
     </p:spTree>
     <p:extLst>
       <p:ext uri="{BB962C8B-B14F-4D97-AF65-F5344CB8AC3E}">
@@ -4645,7 +4825,7 @@
         <p:spPr>
           <a:xfrm>
             <a:off x="296816" y="1403595"/>
-            <a:ext cx="5464643" cy="3702977"/>
+            <a:ext cx="6661768" cy="4514178"/>
           </a:xfrm>
         </p:spPr>
       </p:pic>
@@ -4677,7 +4857,7 @@
         </p:blipFill>
         <p:spPr>
           <a:xfrm>
-            <a:off x="6302843" y="1435554"/>
+            <a:off x="7064241" y="1609471"/>
             <a:ext cx="4477375" cy="1819529"/>
           </a:xfrm>
           <a:prstGeom prst="rect">
@@ -4685,6 +4865,41 @@
           </a:prstGeom>
         </p:spPr>
       </p:pic>
+      <p:sp>
+        <p:nvSpPr>
+          <p:cNvPr id="3" name="TextBox 2">
+            <a:extLst>
+              <a:ext uri="{FF2B5EF4-FFF2-40B4-BE49-F238E27FC236}">
+                <a16:creationId xmlns:a16="http://schemas.microsoft.com/office/drawing/2014/main" id="{C0417CF2-C9B9-FCB6-435C-E4162962E017}"/>
+              </a:ext>
+            </a:extLst>
+          </p:cNvPr>
+          <p:cNvSpPr txBox="1"/>
+          <p:nvPr/>
+        </p:nvSpPr>
+        <p:spPr>
+          <a:xfrm>
+            <a:off x="3627700" y="566241"/>
+            <a:ext cx="7315200" cy="923330"/>
+          </a:xfrm>
+          <a:prstGeom prst="rect">
+            <a:avLst/>
+          </a:prstGeom>
+          <a:noFill/>
+        </p:spPr>
+        <p:txBody>
+          <a:bodyPr wrap="square" rtlCol="0">
+            <a:spAutoFit/>
+          </a:bodyPr>
+          <a:lstStyle/>
+          <a:p>
+            <a:r>
+              <a:rPr lang="en-GB" dirty="0"/>
+              <a:t>Added Invalid input prompt if numbers and specials added, rather than allowing the input to continue with special characters and numbers removed</a:t>
+            </a:r>
+          </a:p>
+        </p:txBody>
+      </p:sp>
     </p:spTree>
     <p:extLst>
       <p:ext uri="{BB962C8B-B14F-4D97-AF65-F5344CB8AC3E}">
@@ -4814,6 +5029,49 @@
           </a:prstGeom>
         </p:spPr>
       </p:pic>
+      <p:sp>
+        <p:nvSpPr>
+          <p:cNvPr id="3" name="TextBox 2">
+            <a:extLst>
+              <a:ext uri="{FF2B5EF4-FFF2-40B4-BE49-F238E27FC236}">
+                <a16:creationId xmlns:a16="http://schemas.microsoft.com/office/drawing/2014/main" id="{40FB8CF9-A2F5-A664-BAA9-BB3673166521}"/>
+              </a:ext>
+            </a:extLst>
+          </p:cNvPr>
+          <p:cNvSpPr txBox="1"/>
+          <p:nvPr/>
+        </p:nvSpPr>
+        <p:spPr>
+          <a:xfrm>
+            <a:off x="4197096" y="777240"/>
+            <a:ext cx="6062472" cy="646331"/>
+          </a:xfrm>
+          <a:prstGeom prst="rect">
+            <a:avLst/>
+          </a:prstGeom>
+          <a:noFill/>
+        </p:spPr>
+        <p:txBody>
+          <a:bodyPr wrap="square" rtlCol="0">
+            <a:spAutoFit/>
+          </a:bodyPr>
+          <a:lstStyle/>
+          <a:p>
+            <a:r>
+              <a:rPr lang="en-GB" dirty="0"/>
+              <a:t>Altered invalid input prompt to accept spaces, then remove them. (as long as </a:t>
+            </a:r>
+            <a:r>
+              <a:rPr lang="en-GB" dirty="0" err="1"/>
+              <a:t>theres</a:t>
+            </a:r>
+            <a:r>
+              <a:rPr lang="en-GB" dirty="0"/>
+              <a:t> no special characters or numbers)</a:t>
+            </a:r>
+          </a:p>
+        </p:txBody>
+      </p:sp>
     </p:spTree>
     <p:extLst>
       <p:ext uri="{BB962C8B-B14F-4D97-AF65-F5344CB8AC3E}">

</xml_diff>